<commit_message>
Adding files to 29th Sep folder
</commit_message>
<xml_diff>
--- a/MicrosoftReactor/Demos.pptx
+++ b/MicrosoftReactor/Demos.pptx
@@ -5863,7 +5863,7 @@
         </p:blipFill>
         <p:spPr bwMode="auto">
           <a:xfrm>
-            <a:off x="1666070" y="3051292"/>
+            <a:off x="1666070" y="1118797"/>
             <a:ext cx="857250" cy="809625"/>
           </a:xfrm>
           <a:prstGeom prst="rect">
@@ -5917,6 +5917,53 @@
           </a:fontRef>
         </p:style>
       </p:cxnSp>
+      <p:pic>
+        <p:nvPicPr>
+          <p:cNvPr id="19" name="Picture 2">
+            <a:extLst>
+              <a:ext uri="{FF2B5EF4-FFF2-40B4-BE49-F238E27FC236}">
+                <a16:creationId xmlns:a16="http://schemas.microsoft.com/office/drawing/2014/main" id="{81596101-A8EB-49A3-935D-208ECEA59F5F}"/>
+              </a:ext>
+            </a:extLst>
+          </p:cNvPr>
+          <p:cNvPicPr>
+            <a:picLocks noChangeAspect="1" noChangeArrowheads="1"/>
+          </p:cNvPicPr>
+          <p:nvPr/>
+        </p:nvPicPr>
+        <p:blipFill>
+          <a:blip r:embed="rId5">
+            <a:extLst>
+              <a:ext uri="{28A0092B-C50C-407E-A947-70E740481C1C}">
+                <a14:useLocalDpi xmlns:a14="http://schemas.microsoft.com/office/drawing/2010/main" val="0"/>
+              </a:ext>
+            </a:extLst>
+          </a:blip>
+          <a:srcRect/>
+          <a:stretch>
+            <a:fillRect/>
+          </a:stretch>
+        </p:blipFill>
+        <p:spPr bwMode="auto">
+          <a:xfrm>
+            <a:off x="1666070" y="4336837"/>
+            <a:ext cx="857250" cy="809625"/>
+          </a:xfrm>
+          <a:prstGeom prst="rect">
+            <a:avLst/>
+          </a:prstGeom>
+          <a:noFill/>
+          <a:extLst>
+            <a:ext uri="{909E8E84-426E-40DD-AFC4-6F175D3DCCD1}">
+              <a14:hiddenFill xmlns:a14="http://schemas.microsoft.com/office/drawing/2010/main">
+                <a:solidFill>
+                  <a:srgbClr val="FFFFFF"/>
+                </a:solidFill>
+              </a14:hiddenFill>
+            </a:ext>
+          </a:extLst>
+        </p:spPr>
+      </p:pic>
     </p:spTree>
     <p:extLst>
       <p:ext uri="{BB962C8B-B14F-4D97-AF65-F5344CB8AC3E}">

</xml_diff>